<commit_message>
added abstract and introduction
update paper

new update with conclusion

proof reading introduction and abstract

current version

updated introduction, rewrite conclusion

updated figure with different radii, fix typos and refs

improved version with new positioning of tables and figures and corrected text
</commit_message>
<xml_diff>
--- a/paper/gfx/Präsentation1.pptx
+++ b/paper/gfx/Präsentation1.pptx
@@ -8,6 +8,7 @@
     <p:sldId id="256" r:id="rId2"/>
     <p:sldId id="257" r:id="rId3"/>
     <p:sldId id="258" r:id="rId4"/>
+    <p:sldId id="259" r:id="rId5"/>
   </p:sldIdLst>
   <p:sldSz cx="12192000" cy="6858000"/>
   <p:notesSz cx="6858000" cy="9144000"/>
@@ -106,6 +107,11 @@
       </a:defRPr>
     </a:lvl9pPr>
   </p:defaultTextStyle>
+  <p:extLst>
+    <p:ext uri="{EFAFB233-063F-42B5-8137-9DF3F51BA10A}">
+      <p15:sldGuideLst xmlns:p15="http://schemas.microsoft.com/office/powerpoint/2012/main"/>
+    </p:ext>
+  </p:extLst>
 </p:presentation>
 </file>
 
@@ -240,7 +246,7 @@
           <a:p>
             <a:fld id="{9E0AB47A-0D4F-4477-9D66-E57A5EC8123E}" type="datetimeFigureOut">
               <a:rPr lang="de-DE" smtClean="0"/>
-              <a:t>29.11.2024</a:t>
+              <a:t>30.12.2024</a:t>
             </a:fld>
             <a:endParaRPr lang="de-DE"/>
           </a:p>
@@ -410,7 +416,7 @@
           <a:p>
             <a:fld id="{9E0AB47A-0D4F-4477-9D66-E57A5EC8123E}" type="datetimeFigureOut">
               <a:rPr lang="de-DE" smtClean="0"/>
-              <a:t>29.11.2024</a:t>
+              <a:t>30.12.2024</a:t>
             </a:fld>
             <a:endParaRPr lang="de-DE"/>
           </a:p>
@@ -590,7 +596,7 @@
           <a:p>
             <a:fld id="{9E0AB47A-0D4F-4477-9D66-E57A5EC8123E}" type="datetimeFigureOut">
               <a:rPr lang="de-DE" smtClean="0"/>
-              <a:t>29.11.2024</a:t>
+              <a:t>30.12.2024</a:t>
             </a:fld>
             <a:endParaRPr lang="de-DE"/>
           </a:p>
@@ -760,7 +766,7 @@
           <a:p>
             <a:fld id="{9E0AB47A-0D4F-4477-9D66-E57A5EC8123E}" type="datetimeFigureOut">
               <a:rPr lang="de-DE" smtClean="0"/>
-              <a:t>29.11.2024</a:t>
+              <a:t>30.12.2024</a:t>
             </a:fld>
             <a:endParaRPr lang="de-DE"/>
           </a:p>
@@ -1006,7 +1012,7 @@
           <a:p>
             <a:fld id="{9E0AB47A-0D4F-4477-9D66-E57A5EC8123E}" type="datetimeFigureOut">
               <a:rPr lang="de-DE" smtClean="0"/>
-              <a:t>29.11.2024</a:t>
+              <a:t>30.12.2024</a:t>
             </a:fld>
             <a:endParaRPr lang="de-DE"/>
           </a:p>
@@ -1238,7 +1244,7 @@
           <a:p>
             <a:fld id="{9E0AB47A-0D4F-4477-9D66-E57A5EC8123E}" type="datetimeFigureOut">
               <a:rPr lang="de-DE" smtClean="0"/>
-              <a:t>29.11.2024</a:t>
+              <a:t>30.12.2024</a:t>
             </a:fld>
             <a:endParaRPr lang="de-DE"/>
           </a:p>
@@ -1605,7 +1611,7 @@
           <a:p>
             <a:fld id="{9E0AB47A-0D4F-4477-9D66-E57A5EC8123E}" type="datetimeFigureOut">
               <a:rPr lang="de-DE" smtClean="0"/>
-              <a:t>29.11.2024</a:t>
+              <a:t>30.12.2024</a:t>
             </a:fld>
             <a:endParaRPr lang="de-DE"/>
           </a:p>
@@ -1723,7 +1729,7 @@
           <a:p>
             <a:fld id="{9E0AB47A-0D4F-4477-9D66-E57A5EC8123E}" type="datetimeFigureOut">
               <a:rPr lang="de-DE" smtClean="0"/>
-              <a:t>29.11.2024</a:t>
+              <a:t>30.12.2024</a:t>
             </a:fld>
             <a:endParaRPr lang="de-DE"/>
           </a:p>
@@ -1818,7 +1824,7 @@
           <a:p>
             <a:fld id="{9E0AB47A-0D4F-4477-9D66-E57A5EC8123E}" type="datetimeFigureOut">
               <a:rPr lang="de-DE" smtClean="0"/>
-              <a:t>29.11.2024</a:t>
+              <a:t>30.12.2024</a:t>
             </a:fld>
             <a:endParaRPr lang="de-DE"/>
           </a:p>
@@ -2095,7 +2101,7 @@
           <a:p>
             <a:fld id="{9E0AB47A-0D4F-4477-9D66-E57A5EC8123E}" type="datetimeFigureOut">
               <a:rPr lang="de-DE" smtClean="0"/>
-              <a:t>29.11.2024</a:t>
+              <a:t>30.12.2024</a:t>
             </a:fld>
             <a:endParaRPr lang="de-DE"/>
           </a:p>
@@ -2348,7 +2354,7 @@
           <a:p>
             <a:fld id="{9E0AB47A-0D4F-4477-9D66-E57A5EC8123E}" type="datetimeFigureOut">
               <a:rPr lang="de-DE" smtClean="0"/>
-              <a:t>29.11.2024</a:t>
+              <a:t>30.12.2024</a:t>
             </a:fld>
             <a:endParaRPr lang="de-DE"/>
           </a:p>
@@ -2561,7 +2567,7 @@
           <a:p>
             <a:fld id="{9E0AB47A-0D4F-4477-9D66-E57A5EC8123E}" type="datetimeFigureOut">
               <a:rPr lang="de-DE" smtClean="0"/>
-              <a:t>29.11.2024</a:t>
+              <a:t>30.12.2024</a:t>
             </a:fld>
             <a:endParaRPr lang="de-DE"/>
           </a:p>
@@ -3357,6 +3363,138 @@
 </p:sld>
 </file>
 
+<file path=ppt/slides/slide4.xml><?xml version="1.0" encoding="utf-8"?>
+<p:sld xmlns:a="http://schemas.openxmlformats.org/drawingml/2006/main" xmlns:r="http://schemas.openxmlformats.org/officeDocument/2006/relationships" xmlns:p="http://schemas.openxmlformats.org/presentationml/2006/main">
+  <p:cSld>
+    <p:spTree>
+      <p:nvGrpSpPr>
+        <p:cNvPr id="1" name=""/>
+        <p:cNvGrpSpPr/>
+        <p:nvPr/>
+      </p:nvGrpSpPr>
+      <p:grpSpPr>
+        <a:xfrm>
+          <a:off x="0" y="0"/>
+          <a:ext cx="0" cy="0"/>
+          <a:chOff x="0" y="0"/>
+          <a:chExt cx="0" cy="0"/>
+        </a:xfrm>
+      </p:grpSpPr>
+      <p:grpSp>
+        <p:nvGrpSpPr>
+          <p:cNvPr id="5" name="Gruppieren 4"/>
+          <p:cNvGrpSpPr/>
+          <p:nvPr/>
+        </p:nvGrpSpPr>
+        <p:grpSpPr>
+          <a:xfrm>
+            <a:off x="-259231" y="1479665"/>
+            <a:ext cx="13505017" cy="4320000"/>
+            <a:chOff x="-259231" y="1479665"/>
+            <a:chExt cx="13505017" cy="4320000"/>
+          </a:xfrm>
+        </p:grpSpPr>
+        <p:pic>
+          <p:nvPicPr>
+            <p:cNvPr id="2" name="Grafik 1"/>
+            <p:cNvPicPr>
+              <a:picLocks noChangeAspect="1"/>
+            </p:cNvPicPr>
+            <p:nvPr/>
+          </p:nvPicPr>
+          <p:blipFill rotWithShape="1">
+            <a:blip r:embed="rId2">
+              <a:extLst>
+                <a:ext uri="{28A0092B-C50C-407E-A947-70E740481C1C}">
+                  <a14:useLocalDpi xmlns:a14="http://schemas.microsoft.com/office/drawing/2010/main" val="0"/>
+                </a:ext>
+              </a:extLst>
+            </a:blip>
+            <a:srcRect l="3133" t="5634" r="28420" b="10297"/>
+            <a:stretch/>
+          </p:blipFill>
+          <p:spPr>
+            <a:xfrm rot="10800000">
+              <a:off x="4267853" y="1479665"/>
+              <a:ext cx="4313694" cy="4320000"/>
+            </a:xfrm>
+            <a:prstGeom prst="rect">
+              <a:avLst/>
+            </a:prstGeom>
+          </p:spPr>
+        </p:pic>
+        <p:pic>
+          <p:nvPicPr>
+            <p:cNvPr id="3" name="Grafik 2"/>
+            <p:cNvPicPr>
+              <a:picLocks noChangeAspect="1"/>
+            </p:cNvPicPr>
+            <p:nvPr/>
+          </p:nvPicPr>
+          <p:blipFill rotWithShape="1">
+            <a:blip r:embed="rId3">
+              <a:extLst>
+                <a:ext uri="{28A0092B-C50C-407E-A947-70E740481C1C}">
+                  <a14:useLocalDpi xmlns:a14="http://schemas.microsoft.com/office/drawing/2010/main" val="0"/>
+                </a:ext>
+              </a:extLst>
+            </a:blip>
+            <a:srcRect l="14129" t="5846" r="18457" b="23211"/>
+            <a:stretch/>
+          </p:blipFill>
+          <p:spPr>
+            <a:xfrm rot="10800000">
+              <a:off x="-259231" y="1479665"/>
+              <a:ext cx="4208324" cy="4320000"/>
+            </a:xfrm>
+            <a:prstGeom prst="rect">
+              <a:avLst/>
+            </a:prstGeom>
+          </p:spPr>
+        </p:pic>
+        <p:pic>
+          <p:nvPicPr>
+            <p:cNvPr id="4" name="Grafik 3"/>
+            <p:cNvPicPr>
+              <a:picLocks noChangeAspect="1"/>
+            </p:cNvPicPr>
+            <p:nvPr/>
+          </p:nvPicPr>
+          <p:blipFill rotWithShape="1">
+            <a:blip r:embed="rId4">
+              <a:extLst>
+                <a:ext uri="{28A0092B-C50C-407E-A947-70E740481C1C}">
+                  <a14:useLocalDpi xmlns:a14="http://schemas.microsoft.com/office/drawing/2010/main" val="0"/>
+                </a:ext>
+              </a:extLst>
+            </a:blip>
+            <a:srcRect l="8539" t="6303" r="18228" b="11878"/>
+            <a:stretch/>
+          </p:blipFill>
+          <p:spPr>
+            <a:xfrm rot="10800000">
+              <a:off x="8900307" y="1479665"/>
+              <a:ext cx="4345479" cy="4320000"/>
+            </a:xfrm>
+            <a:prstGeom prst="rect">
+              <a:avLst/>
+            </a:prstGeom>
+          </p:spPr>
+        </p:pic>
+      </p:grpSp>
+    </p:spTree>
+    <p:extLst>
+      <p:ext uri="{BB962C8B-B14F-4D97-AF65-F5344CB8AC3E}">
+        <p14:creationId xmlns:p14="http://schemas.microsoft.com/office/powerpoint/2010/main" val="3026959580"/>
+      </p:ext>
+    </p:extLst>
+  </p:cSld>
+  <p:clrMapOvr>
+    <a:masterClrMapping/>
+  </p:clrMapOvr>
+</p:sld>
+</file>
+
 <file path=ppt/theme/theme1.xml><?xml version="1.0" encoding="utf-8"?>
 <a:theme xmlns:a="http://schemas.openxmlformats.org/drawingml/2006/main" name="Office">
   <a:themeElements>

</xml_diff>